<commit_message>
Updated CUDA presentation with short overview
</commit_message>
<xml_diff>
--- a/CUDA_presentation.pptx
+++ b/CUDA_presentation.pptx
@@ -5,16 +5,17 @@
     <p:sldMasterId id="2147483652" r:id="rId1"/>
   </p:sldMasterIdLst>
   <p:notesMasterIdLst>
-    <p:notesMasterId r:id="rId6"/>
+    <p:notesMasterId r:id="rId7"/>
   </p:notesMasterIdLst>
   <p:handoutMasterIdLst>
-    <p:handoutMasterId r:id="rId7"/>
+    <p:handoutMasterId r:id="rId8"/>
   </p:handoutMasterIdLst>
   <p:sldIdLst>
-    <p:sldId id="836" r:id="rId2"/>
-    <p:sldId id="837" r:id="rId3"/>
-    <p:sldId id="838" r:id="rId4"/>
-    <p:sldId id="839" r:id="rId5"/>
+    <p:sldId id="840" r:id="rId2"/>
+    <p:sldId id="836" r:id="rId3"/>
+    <p:sldId id="837" r:id="rId4"/>
+    <p:sldId id="838" r:id="rId5"/>
+    <p:sldId id="839" r:id="rId6"/>
   </p:sldIdLst>
   <p:sldSz cx="9144000" cy="6858000" type="screen4x3"/>
   <p:notesSz cx="6781800" cy="9855200"/>
@@ -145,7 +146,7 @@
   </p:defaultTextStyle>
   <p:extLst>
     <p:ext uri="{EFAFB233-063F-42B5-8137-9DF3F51BA10A}">
-      <p15:sldGuideLst xmlns:p15="http://schemas.microsoft.com/office/powerpoint/2012/main" xmlns="">
+      <p15:sldGuideLst xmlns:p15="http://schemas.microsoft.com/office/powerpoint/2012/main">
         <p15:guide id="1" orient="horz" pos="4042">
           <p15:clr>
             <a:srgbClr val="A4A3A4"/>
@@ -159,7 +160,7 @@
       </p15:sldGuideLst>
     </p:ext>
     <p:ext uri="{2D200454-40CA-4A62-9FC3-DE9A4176ACB9}">
-      <p15:notesGuideLst xmlns:p15="http://schemas.microsoft.com/office/powerpoint/2012/main" xmlns="">
+      <p15:notesGuideLst xmlns:p15="http://schemas.microsoft.com/office/powerpoint/2012/main">
         <p15:guide id="1" orient="horz" pos="3103">
           <p15:clr>
             <a:srgbClr val="A4A3A4"/>
@@ -204,7 +205,7 @@
     </p:spTree>
     <p:extLst>
       <p:ext uri="{BB962C8B-B14F-4D97-AF65-F5344CB8AC3E}">
-        <p14:creationId xmlns:p14="http://schemas.microsoft.com/office/powerpoint/2010/main" xmlns="" val="2827864849"/>
+        <p14:creationId xmlns:p14="http://schemas.microsoft.com/office/powerpoint/2010/main" val="2827864849"/>
       </p:ext>
     </p:extLst>
   </p:cSld>
@@ -332,7 +333,7 @@
             <a:fld id="{AE02961B-B228-4466-84E5-B65BB245109F}" type="datetimeFigureOut">
               <a:rPr lang="de-DE"/>
               <a:pPr/>
-              <a:t>03.06.2018</a:t>
+              <a:t>17.06.2018</a:t>
             </a:fld>
             <a:endParaRPr lang="de-DE"/>
           </a:p>
@@ -404,35 +405,35 @@
           <a:p>
             <a:pPr lvl="0"/>
             <a:r>
-              <a:rPr lang="de-DE" noProof="0" dirty="0" smtClean="0"/>
+              <a:rPr lang="de-DE" noProof="0" dirty="0"/>
               <a:t>Mastertextformat bearbeiten</a:t>
             </a:r>
           </a:p>
           <a:p>
             <a:pPr lvl="1"/>
             <a:r>
-              <a:rPr lang="de-DE" noProof="0" dirty="0" smtClean="0"/>
+              <a:rPr lang="de-DE" noProof="0" dirty="0"/>
               <a:t>Zweite Ebene</a:t>
             </a:r>
           </a:p>
           <a:p>
             <a:pPr lvl="2"/>
             <a:r>
-              <a:rPr lang="de-DE" noProof="0" dirty="0" smtClean="0"/>
+              <a:rPr lang="de-DE" noProof="0" dirty="0"/>
               <a:t>Dritte Ebene</a:t>
             </a:r>
           </a:p>
           <a:p>
             <a:pPr lvl="3"/>
             <a:r>
-              <a:rPr lang="de-DE" noProof="0" dirty="0" smtClean="0"/>
+              <a:rPr lang="de-DE" noProof="0" dirty="0"/>
               <a:t>Vierte Ebene</a:t>
             </a:r>
           </a:p>
           <a:p>
             <a:pPr lvl="4"/>
             <a:r>
-              <a:rPr lang="de-DE" noProof="0" dirty="0" smtClean="0"/>
+              <a:rPr lang="de-DE" noProof="0" dirty="0"/>
               <a:t>Fünfte Ebene</a:t>
             </a:r>
           </a:p>
@@ -533,7 +534,7 @@
             <a:fld id="{87E9C61A-9B5E-4580-98DD-1AC874081FFB}" type="slidenum">
               <a:rPr lang="de-DE"/>
               <a:pPr/>
-              <a:t>‹Nr.›</a:t>
+              <a:t>‹N°›</a:t>
             </a:fld>
             <a:endParaRPr lang="de-DE"/>
           </a:p>
@@ -542,7 +543,7 @@
     </p:spTree>
     <p:extLst>
       <p:ext uri="{BB962C8B-B14F-4D97-AF65-F5344CB8AC3E}">
-        <p14:creationId xmlns:p14="http://schemas.microsoft.com/office/powerpoint/2010/main" xmlns="" val="2856692655"/>
+        <p14:creationId xmlns:p14="http://schemas.microsoft.com/office/powerpoint/2010/main" val="2856692655"/>
       </p:ext>
     </p:extLst>
   </p:cSld>
@@ -754,11 +755,7 @@
           <a:p>
             <a:r>
               <a:rPr lang="de-DE" dirty="0"/>
-              <a:t>Master-Untertitelformat </a:t>
-            </a:r>
-            <a:r>
-              <a:rPr lang="de-DE" dirty="0" smtClean="0"/>
-              <a:t>bearbeiten</a:t>
+              <a:t>Master-Untertitelformat bearbeiten</a:t>
             </a:r>
           </a:p>
         </p:txBody>
@@ -798,16 +795,15 @@
           </a:lstStyle>
           <a:p>
             <a:r>
-              <a:rPr lang="de-DE" dirty="0" smtClean="0"/>
+              <a:rPr lang="de-DE" dirty="0"/>
               <a:t>Vortragstitel (Titel der Arbeit) durch Klicken hinzufügen</a:t>
             </a:r>
-            <a:endParaRPr lang="de-DE" dirty="0"/>
           </a:p>
         </p:txBody>
       </p:sp>
       <p:sp>
         <p:nvSpPr>
-          <p:cNvPr id="5" name="Rectangle 4"/>
+          <p:cNvPr id="5" name="Espace réservé du numéro de diapositive 4"/>
           <p:cNvSpPr>
             <a:spLocks noGrp="1" noChangeArrowheads="1"/>
           </p:cNvSpPr>
@@ -856,7 +852,7 @@
               <a:pPr>
                 <a:defRPr/>
               </a:pPr>
-              <a:t>‹Nr.›</a:t>
+              <a:t>‹N°›</a:t>
             </a:fld>
             <a:endParaRPr lang="de-DE" dirty="0"/>
           </a:p>
@@ -906,7 +902,7 @@
           </a:lstStyle>
           <a:p>
             <a:r>
-              <a:rPr lang="de-DE" smtClean="0"/>
+              <a:rPr lang="de-DE"/>
               <a:t>Vortrags-Kurztitel (Für alle Folien setzen: Klick auf "Einfügen" - "Kopf- und Fußzeile")</a:t>
             </a:r>
             <a:endParaRPr lang="de-DE" dirty="0"/>
@@ -942,7 +938,7 @@
           <a:p>
             <a:pPr lvl="0"/>
             <a:r>
-              <a:rPr lang="de-DE" dirty="0" smtClean="0"/>
+              <a:rPr lang="de-DE" dirty="0"/>
               <a:t>Name des Vortragenden durch Klicken hinzufügen</a:t>
             </a:r>
           </a:p>
@@ -954,13 +950,6 @@
     <a:masterClrMapping/>
   </p:clrMapOvr>
   <p:transition spd="med"/>
-  <p:timing>
-    <p:tnLst>
-      <p:par>
-        <p:cTn id="1" dur="indefinite" restart="never" nodeType="tmRoot"/>
-      </p:par>
-    </p:tnLst>
-  </p:timing>
 </p:sldLayout>
 </file>
 
@@ -997,10 +986,9 @@
           <a:lstStyle/>
           <a:p>
             <a:r>
-              <a:rPr lang="de-DE" dirty="0" smtClean="0"/>
+              <a:rPr lang="de-DE" dirty="0"/>
               <a:t>Titelmasterformat durch Klicken bearbeiten</a:t>
             </a:r>
-            <a:endParaRPr lang="de-DE" dirty="0"/>
           </a:p>
         </p:txBody>
       </p:sp>
@@ -1047,38 +1035,37 @@
           <a:p>
             <a:pPr lvl="0"/>
             <a:r>
-              <a:rPr lang="de-DE" dirty="0" smtClean="0"/>
+              <a:rPr lang="de-DE" dirty="0"/>
               <a:t>Textmasterformate durch Klicken bearbeiten</a:t>
             </a:r>
           </a:p>
           <a:p>
             <a:pPr lvl="1"/>
             <a:r>
-              <a:rPr lang="de-DE" dirty="0" smtClean="0"/>
+              <a:rPr lang="de-DE" dirty="0"/>
               <a:t>Zweite Ebene</a:t>
             </a:r>
           </a:p>
           <a:p>
             <a:pPr lvl="2"/>
             <a:r>
-              <a:rPr lang="de-DE" dirty="0" smtClean="0"/>
+              <a:rPr lang="de-DE" dirty="0"/>
               <a:t>Dritte Ebene</a:t>
             </a:r>
           </a:p>
           <a:p>
             <a:pPr lvl="3"/>
             <a:r>
-              <a:rPr lang="de-DE" dirty="0" smtClean="0"/>
+              <a:rPr lang="de-DE" dirty="0"/>
               <a:t>Vierte Ebene</a:t>
             </a:r>
           </a:p>
           <a:p>
             <a:pPr lvl="4"/>
             <a:r>
-              <a:rPr lang="de-DE" dirty="0" smtClean="0"/>
+              <a:rPr lang="de-DE" dirty="0"/>
               <a:t>Fünfte Ebene</a:t>
             </a:r>
-            <a:endParaRPr lang="de-DE" dirty="0"/>
           </a:p>
         </p:txBody>
       </p:sp>
@@ -1133,7 +1120,7 @@
               <a:pPr>
                 <a:defRPr/>
               </a:pPr>
-              <a:t>‹Nr.›</a:t>
+              <a:t>‹N°›</a:t>
             </a:fld>
             <a:endParaRPr lang="de-DE" dirty="0"/>
           </a:p>
@@ -1183,7 +1170,7 @@
           </a:lstStyle>
           <a:p>
             <a:r>
-              <a:rPr lang="de-DE" smtClean="0"/>
+              <a:rPr lang="de-DE"/>
               <a:t>Vortrags-Kurztitel (Für alle Folien setzen: Klick auf "Einfügen" - "Kopf- und Fußzeile")</a:t>
             </a:r>
             <a:endParaRPr lang="de-DE" dirty="0"/>
@@ -1196,13 +1183,6 @@
     <a:masterClrMapping/>
   </p:clrMapOvr>
   <p:transition spd="med"/>
-  <p:timing>
-    <p:tnLst>
-      <p:par>
-        <p:cTn id="1" dur="indefinite" restart="never" nodeType="tmRoot"/>
-      </p:par>
-    </p:tnLst>
-  </p:timing>
 </p:sldLayout>
 </file>
 
@@ -1314,7 +1294,7 @@
               <a:pPr>
                 <a:defRPr/>
               </a:pPr>
-              <a:t>‹Nr.›</a:t>
+              <a:t>‹N°›</a:t>
             </a:fld>
             <a:endParaRPr lang="de-DE" dirty="0"/>
           </a:p>
@@ -1356,7 +1336,7 @@
           <a:p>
             <a:pPr lvl="0"/>
             <a:r>
-              <a:rPr lang="de-DE" smtClean="0"/>
+              <a:rPr lang="de-DE"/>
               <a:t>Mastertitelformat bearbeiten</a:t>
             </a:r>
           </a:p>
@@ -1364,7 +1344,7 @@
       </p:sp>
       <p:pic>
         <p:nvPicPr>
-          <p:cNvPr id="1031" name="Grafik 9" descr="mnmLogoNeu-50grau.pdf.emf"/>
+          <p:cNvPr id="1032" name="Grafik 10" descr="IFI_notext-neueFarben.eps.emf"/>
           <p:cNvPicPr>
             <a:picLocks noChangeAspect="1"/>
           </p:cNvPicPr>
@@ -1379,39 +1359,7 @@
         </p:blipFill>
         <p:spPr bwMode="auto">
           <a:xfrm>
-            <a:off x="6215063" y="498475"/>
-            <a:ext cx="1785937" cy="484188"/>
-          </a:xfrm>
-          <a:prstGeom prst="rect">
-            <a:avLst/>
-          </a:prstGeom>
-          <a:noFill/>
-          <a:ln w="9525">
-            <a:noFill/>
-            <a:miter lim="800000"/>
-            <a:headEnd/>
-            <a:tailEnd/>
-          </a:ln>
-        </p:spPr>
-      </p:pic>
-      <p:pic>
-        <p:nvPicPr>
-          <p:cNvPr id="1032" name="Grafik 10" descr="IFI_notext-neueFarben.eps.emf"/>
-          <p:cNvPicPr>
-            <a:picLocks noChangeAspect="1"/>
-          </p:cNvPicPr>
-          <p:nvPr/>
-        </p:nvPicPr>
-        <p:blipFill>
-          <a:blip r:embed="rId6" cstate="print"/>
-          <a:srcRect/>
-          <a:stretch>
-            <a:fillRect/>
-          </a:stretch>
-        </p:blipFill>
-        <p:spPr bwMode="auto">
-          <a:xfrm>
-            <a:off x="7643813" y="214313"/>
+            <a:off x="7596336" y="336650"/>
             <a:ext cx="338137" cy="500062"/>
           </a:xfrm>
           <a:prstGeom prst="rect">
@@ -1530,35 +1478,35 @@
           <a:p>
             <a:pPr lvl="0"/>
             <a:r>
-              <a:rPr lang="de-DE" dirty="0" smtClean="0"/>
+              <a:rPr lang="de-DE" dirty="0"/>
               <a:t>Mastertextformat bearbeiten</a:t>
             </a:r>
           </a:p>
           <a:p>
             <a:pPr lvl="1"/>
             <a:r>
-              <a:rPr lang="de-DE" dirty="0" smtClean="0"/>
+              <a:rPr lang="de-DE" dirty="0"/>
               <a:t>Zweite Ebene</a:t>
             </a:r>
           </a:p>
           <a:p>
             <a:pPr lvl="2"/>
             <a:r>
-              <a:rPr lang="de-DE" dirty="0" smtClean="0"/>
+              <a:rPr lang="de-DE" dirty="0"/>
               <a:t>Dritte Ebene</a:t>
             </a:r>
           </a:p>
           <a:p>
             <a:pPr lvl="3"/>
             <a:r>
-              <a:rPr lang="de-DE" dirty="0" smtClean="0"/>
+              <a:rPr lang="de-DE" dirty="0"/>
               <a:t>Vierte Ebene</a:t>
             </a:r>
           </a:p>
           <a:p>
             <a:pPr lvl="4"/>
             <a:r>
-              <a:rPr lang="de-DE" dirty="0" smtClean="0"/>
+              <a:rPr lang="de-DE" dirty="0"/>
               <a:t>Fünfte Ebene</a:t>
             </a:r>
           </a:p>
@@ -1608,7 +1556,7 @@
           </a:lstStyle>
           <a:p>
             <a:r>
-              <a:rPr lang="de-DE" smtClean="0"/>
+              <a:rPr lang="de-DE"/>
               <a:t>Vortrags-Kurztitel (Für alle Folien setzen: Klick auf "Einfügen" - "Kopf- und Fußzeile")</a:t>
             </a:r>
             <a:endParaRPr lang="de-DE" dirty="0"/>
@@ -1623,13 +1571,6 @@
     <p:sldLayoutId id="2147483677" r:id="rId2"/>
   </p:sldLayoutIdLst>
   <p:transition spd="med"/>
-  <p:timing>
-    <p:tnLst>
-      <p:par>
-        <p:cTn id="1" dur="indefinite" restart="never" nodeType="tmRoot"/>
-      </p:par>
-    </p:tnLst>
-  </p:timing>
   <p:hf hdr="0" dt="0"/>
   <p:txStyles>
     <p:titleStyle>
@@ -2037,6 +1978,985 @@
       </p:grpSpPr>
       <p:sp>
         <p:nvSpPr>
+          <p:cNvPr id="18" name="Rectangle 17">
+            <a:extLst>
+              <a:ext uri="{FF2B5EF4-FFF2-40B4-BE49-F238E27FC236}">
+                <a16:creationId xmlns:a16="http://schemas.microsoft.com/office/drawing/2014/main" id="{37EC3891-AB86-4AD7-8E53-DACDC7654906}"/>
+              </a:ext>
+            </a:extLst>
+          </p:cNvPr>
+          <p:cNvSpPr/>
+          <p:nvPr/>
+        </p:nvSpPr>
+        <p:spPr bwMode="auto">
+          <a:xfrm>
+            <a:off x="0" y="6291324"/>
+            <a:ext cx="9546570" cy="588494"/>
+          </a:xfrm>
+          <a:prstGeom prst="rect">
+            <a:avLst/>
+          </a:prstGeom>
+          <a:solidFill>
+            <a:schemeClr val="bg1"/>
+          </a:solidFill>
+          <a:ln w="12700" cap="flat" cmpd="sng" algn="ctr">
+            <a:noFill/>
+            <a:prstDash val="solid"/>
+            <a:round/>
+            <a:headEnd type="none" w="med" len="med"/>
+            <a:tailEnd type="none" w="med" len="med"/>
+          </a:ln>
+          <a:effectLst/>
+        </p:spPr>
+        <p:txBody>
+          <a:bodyPr vert="horz" wrap="square" lIns="91440" tIns="45720" rIns="91440" bIns="45720" numCol="1" rtlCol="0" anchor="t" anchorCtr="0" compatLnSpc="1">
+            <a:prstTxWarp prst="textNoShape">
+              <a:avLst/>
+            </a:prstTxWarp>
+          </a:bodyPr>
+          <a:lstStyle/>
+          <a:p>
+            <a:pPr marL="0" marR="0" indent="0" algn="l" defTabSz="914400" rtl="0" eaLnBrk="0" fontAlgn="base" latinLnBrk="0" hangingPunct="0">
+              <a:lnSpc>
+                <a:spcPct val="100000"/>
+              </a:lnSpc>
+              <a:spcBef>
+                <a:spcPct val="0"/>
+              </a:spcBef>
+              <a:spcAft>
+                <a:spcPct val="0"/>
+              </a:spcAft>
+              <a:buClrTx/>
+              <a:buSzTx/>
+              <a:buFontTx/>
+              <a:buNone/>
+              <a:tabLst/>
+            </a:pPr>
+            <a:endParaRPr kumimoji="0" lang="en-US" sz="1400" b="0" i="0" u="none" strike="noStrike" cap="none" normalizeH="0" baseline="0" dirty="0">
+              <a:ln>
+                <a:noFill/>
+              </a:ln>
+              <a:solidFill>
+                <a:schemeClr val="tx1"/>
+              </a:solidFill>
+              <a:effectLst/>
+              <a:latin typeface="LMU CompatilFact" pitchFamily="2" charset="0"/>
+            </a:endParaRPr>
+          </a:p>
+        </p:txBody>
+      </p:sp>
+      <p:sp>
+        <p:nvSpPr>
+          <p:cNvPr id="22" name="Rectangle 21">
+            <a:extLst>
+              <a:ext uri="{FF2B5EF4-FFF2-40B4-BE49-F238E27FC236}">
+                <a16:creationId xmlns:a16="http://schemas.microsoft.com/office/drawing/2014/main" id="{91E840D0-5210-48A9-985F-4710DB7F0E9D}"/>
+              </a:ext>
+            </a:extLst>
+          </p:cNvPr>
+          <p:cNvSpPr/>
+          <p:nvPr/>
+        </p:nvSpPr>
+        <p:spPr bwMode="auto">
+          <a:xfrm>
+            <a:off x="3149049" y="4237835"/>
+            <a:ext cx="5815439" cy="2251505"/>
+          </a:xfrm>
+          <a:prstGeom prst="rect">
+            <a:avLst/>
+          </a:prstGeom>
+          <a:solidFill>
+            <a:schemeClr val="bg1"/>
+          </a:solidFill>
+          <a:ln w="12700" cap="flat" cmpd="sng" algn="ctr">
+            <a:noFill/>
+            <a:prstDash val="solid"/>
+            <a:round/>
+            <a:headEnd type="none" w="med" len="med"/>
+            <a:tailEnd type="none" w="med" len="med"/>
+          </a:ln>
+          <a:effectLst>
+            <a:outerShdw blurRad="63500" sx="102000" sy="102000" algn="ctr" rotWithShape="0">
+              <a:prstClr val="black">
+                <a:alpha val="40000"/>
+              </a:prstClr>
+            </a:outerShdw>
+          </a:effectLst>
+        </p:spPr>
+        <p:txBody>
+          <a:bodyPr vert="horz" wrap="square" lIns="91440" tIns="45720" rIns="91440" bIns="45720" numCol="1" rtlCol="0" anchor="t" anchorCtr="0" compatLnSpc="1">
+            <a:prstTxWarp prst="textNoShape">
+              <a:avLst/>
+            </a:prstTxWarp>
+          </a:bodyPr>
+          <a:lstStyle/>
+          <a:p>
+            <a:pPr marL="0" marR="0" indent="0" algn="l" defTabSz="914400" rtl="0" eaLnBrk="0" fontAlgn="base" latinLnBrk="0" hangingPunct="0">
+              <a:lnSpc>
+                <a:spcPct val="100000"/>
+              </a:lnSpc>
+              <a:spcBef>
+                <a:spcPct val="0"/>
+              </a:spcBef>
+              <a:spcAft>
+                <a:spcPct val="0"/>
+              </a:spcAft>
+              <a:buClrTx/>
+              <a:buSzTx/>
+              <a:buFontTx/>
+              <a:buNone/>
+              <a:tabLst/>
+            </a:pPr>
+            <a:r>
+              <a:rPr kumimoji="0" lang="en-US" sz="1400" b="0" i="0" u="none" strike="noStrike" cap="none" normalizeH="0" baseline="0" dirty="0" err="1">
+                <a:ln>
+                  <a:noFill/>
+                </a:ln>
+                <a:solidFill>
+                  <a:schemeClr val="tx1"/>
+                </a:solidFill>
+                <a:effectLst/>
+                <a:latin typeface="LMU CompatilFact" pitchFamily="2" charset="0"/>
+              </a:rPr>
+              <a:t>Erste</a:t>
+            </a:r>
+            <a:r>
+              <a:rPr kumimoji="0" lang="en-US" sz="1400" b="0" i="0" u="none" strike="noStrike" cap="none" normalizeH="0" baseline="0" dirty="0">
+                <a:ln>
+                  <a:noFill/>
+                </a:ln>
+                <a:solidFill>
+                  <a:schemeClr val="tx1"/>
+                </a:solidFill>
+                <a:effectLst/>
+                <a:latin typeface="LMU CompatilFact" pitchFamily="2" charset="0"/>
+              </a:rPr>
+              <a:t> </a:t>
+            </a:r>
+            <a:r>
+              <a:rPr kumimoji="0" lang="en-US" sz="1400" b="0" i="0" u="none" strike="noStrike" cap="none" normalizeH="0" baseline="0" dirty="0" err="1">
+                <a:ln>
+                  <a:noFill/>
+                </a:ln>
+                <a:solidFill>
+                  <a:schemeClr val="tx1"/>
+                </a:solidFill>
+                <a:effectLst/>
+                <a:latin typeface="LMU CompatilFact" pitchFamily="2" charset="0"/>
+              </a:rPr>
+              <a:t>Ergebnisse</a:t>
+            </a:r>
+            <a:endParaRPr kumimoji="0" lang="en-US" sz="1400" b="0" i="0" u="none" strike="noStrike" cap="none" normalizeH="0" baseline="0" dirty="0">
+              <a:ln>
+                <a:noFill/>
+              </a:ln>
+              <a:solidFill>
+                <a:schemeClr val="tx1"/>
+              </a:solidFill>
+              <a:effectLst/>
+              <a:latin typeface="LMU CompatilFact" pitchFamily="2" charset="0"/>
+            </a:endParaRPr>
+          </a:p>
+        </p:txBody>
+      </p:sp>
+      <p:sp>
+        <p:nvSpPr>
+          <p:cNvPr id="19" name="Rectangle 18">
+            <a:extLst>
+              <a:ext uri="{FF2B5EF4-FFF2-40B4-BE49-F238E27FC236}">
+                <a16:creationId xmlns:a16="http://schemas.microsoft.com/office/drawing/2014/main" id="{B050E218-BA0B-489E-B59E-F153CCED3CA0}"/>
+              </a:ext>
+            </a:extLst>
+          </p:cNvPr>
+          <p:cNvSpPr/>
+          <p:nvPr/>
+        </p:nvSpPr>
+        <p:spPr bwMode="auto">
+          <a:xfrm>
+            <a:off x="143508" y="4237835"/>
+            <a:ext cx="2748834" cy="2251505"/>
+          </a:xfrm>
+          <a:prstGeom prst="rect">
+            <a:avLst/>
+          </a:prstGeom>
+          <a:solidFill>
+            <a:schemeClr val="bg1"/>
+          </a:solidFill>
+          <a:ln w="12700" cap="flat" cmpd="sng" algn="ctr">
+            <a:noFill/>
+            <a:prstDash val="solid"/>
+            <a:round/>
+            <a:headEnd type="none" w="med" len="med"/>
+            <a:tailEnd type="none" w="med" len="med"/>
+          </a:ln>
+          <a:effectLst>
+            <a:outerShdw blurRad="63500" sx="102000" sy="102000" algn="ctr" rotWithShape="0">
+              <a:prstClr val="black">
+                <a:alpha val="40000"/>
+              </a:prstClr>
+            </a:outerShdw>
+          </a:effectLst>
+        </p:spPr>
+        <p:txBody>
+          <a:bodyPr vert="horz" wrap="square" lIns="91440" tIns="45720" rIns="91440" bIns="45720" numCol="1" rtlCol="0" anchor="t" anchorCtr="0" compatLnSpc="1">
+            <a:prstTxWarp prst="textNoShape">
+              <a:avLst/>
+            </a:prstTxWarp>
+          </a:bodyPr>
+          <a:lstStyle/>
+          <a:p>
+            <a:pPr marL="0" marR="0" indent="0" algn="l" defTabSz="914400" rtl="0" eaLnBrk="0" fontAlgn="base" latinLnBrk="0" hangingPunct="0">
+              <a:lnSpc>
+                <a:spcPct val="100000"/>
+              </a:lnSpc>
+              <a:spcBef>
+                <a:spcPct val="0"/>
+              </a:spcBef>
+              <a:spcAft>
+                <a:spcPct val="0"/>
+              </a:spcAft>
+              <a:buClrTx/>
+              <a:buSzTx/>
+              <a:buFontTx/>
+              <a:buNone/>
+              <a:tabLst/>
+            </a:pPr>
+            <a:r>
+              <a:rPr kumimoji="0" lang="en-US" sz="1400" b="0" i="0" u="none" strike="noStrike" cap="none" normalizeH="0" baseline="0" dirty="0" err="1">
+                <a:ln>
+                  <a:noFill/>
+                </a:ln>
+                <a:solidFill>
+                  <a:schemeClr val="tx1"/>
+                </a:solidFill>
+                <a:effectLst/>
+                <a:latin typeface="LMU CompatilFact" pitchFamily="2" charset="0"/>
+              </a:rPr>
+              <a:t>Projektidee</a:t>
+            </a:r>
+            <a:endParaRPr kumimoji="0" lang="en-US" sz="1400" b="0" i="0" u="none" strike="noStrike" cap="none" normalizeH="0" baseline="0" dirty="0">
+              <a:ln>
+                <a:noFill/>
+              </a:ln>
+              <a:solidFill>
+                <a:schemeClr val="tx1"/>
+              </a:solidFill>
+              <a:effectLst/>
+              <a:latin typeface="LMU CompatilFact" pitchFamily="2" charset="0"/>
+            </a:endParaRPr>
+          </a:p>
+        </p:txBody>
+      </p:sp>
+      <p:sp>
+        <p:nvSpPr>
+          <p:cNvPr id="16" name="Rectangle 15">
+            <a:extLst>
+              <a:ext uri="{FF2B5EF4-FFF2-40B4-BE49-F238E27FC236}">
+                <a16:creationId xmlns:a16="http://schemas.microsoft.com/office/drawing/2014/main" id="{68682691-E209-45F7-BA33-E0D30FFFF991}"/>
+              </a:ext>
+            </a:extLst>
+          </p:cNvPr>
+          <p:cNvSpPr/>
+          <p:nvPr/>
+        </p:nvSpPr>
+        <p:spPr bwMode="auto">
+          <a:xfrm>
+            <a:off x="2836250" y="1340768"/>
+            <a:ext cx="6128238" cy="2696805"/>
+          </a:xfrm>
+          <a:prstGeom prst="rect">
+            <a:avLst/>
+          </a:prstGeom>
+          <a:solidFill>
+            <a:schemeClr val="bg1"/>
+          </a:solidFill>
+          <a:ln w="12700" cap="flat" cmpd="sng" algn="ctr">
+            <a:noFill/>
+            <a:prstDash val="solid"/>
+            <a:round/>
+            <a:headEnd type="none" w="med" len="med"/>
+            <a:tailEnd type="none" w="med" len="med"/>
+          </a:ln>
+          <a:effectLst>
+            <a:outerShdw blurRad="63500" sx="102000" sy="102000" algn="ctr" rotWithShape="0">
+              <a:prstClr val="black">
+                <a:alpha val="40000"/>
+              </a:prstClr>
+            </a:outerShdw>
+          </a:effectLst>
+        </p:spPr>
+        <p:txBody>
+          <a:bodyPr vert="horz" wrap="square" lIns="91440" tIns="45720" rIns="91440" bIns="45720" numCol="1" rtlCol="0" anchor="t" anchorCtr="0" compatLnSpc="1">
+            <a:prstTxWarp prst="textNoShape">
+              <a:avLst/>
+            </a:prstTxWarp>
+          </a:bodyPr>
+          <a:lstStyle/>
+          <a:p>
+            <a:pPr marL="0" marR="0" indent="0" algn="l" defTabSz="914400" rtl="0" eaLnBrk="0" fontAlgn="base" latinLnBrk="0" hangingPunct="0">
+              <a:lnSpc>
+                <a:spcPct val="100000"/>
+              </a:lnSpc>
+              <a:spcBef>
+                <a:spcPct val="0"/>
+              </a:spcBef>
+              <a:spcAft>
+                <a:spcPct val="0"/>
+              </a:spcAft>
+              <a:buClrTx/>
+              <a:buSzTx/>
+              <a:buFontTx/>
+              <a:buNone/>
+              <a:tabLst/>
+            </a:pPr>
+            <a:r>
+              <a:rPr kumimoji="0" lang="en-US" sz="1400" b="0" i="0" u="none" strike="noStrike" cap="none" normalizeH="0" baseline="0" dirty="0" err="1">
+                <a:ln>
+                  <a:noFill/>
+                </a:ln>
+                <a:solidFill>
+                  <a:schemeClr val="tx1"/>
+                </a:solidFill>
+                <a:effectLst/>
+                <a:latin typeface="LMU CompatilFact" pitchFamily="2" charset="0"/>
+              </a:rPr>
+              <a:t>Herausforderung</a:t>
+            </a:r>
+            <a:endParaRPr kumimoji="0" lang="en-US" sz="1400" b="0" i="0" u="none" strike="noStrike" cap="none" normalizeH="0" baseline="0" dirty="0">
+              <a:ln>
+                <a:noFill/>
+              </a:ln>
+              <a:solidFill>
+                <a:schemeClr val="tx1"/>
+              </a:solidFill>
+              <a:effectLst/>
+              <a:latin typeface="LMU CompatilFact" pitchFamily="2" charset="0"/>
+            </a:endParaRPr>
+          </a:p>
+        </p:txBody>
+      </p:sp>
+      <p:sp>
+        <p:nvSpPr>
+          <p:cNvPr id="13" name="Rectangle 12">
+            <a:extLst>
+              <a:ext uri="{FF2B5EF4-FFF2-40B4-BE49-F238E27FC236}">
+                <a16:creationId xmlns:a16="http://schemas.microsoft.com/office/drawing/2014/main" id="{63CA96B8-D80B-4AE0-95AC-B7A6744EE01A}"/>
+              </a:ext>
+            </a:extLst>
+          </p:cNvPr>
+          <p:cNvSpPr/>
+          <p:nvPr/>
+        </p:nvSpPr>
+        <p:spPr bwMode="auto">
+          <a:xfrm>
+            <a:off x="143508" y="1340768"/>
+            <a:ext cx="2412268" cy="2700302"/>
+          </a:xfrm>
+          <a:prstGeom prst="rect">
+            <a:avLst/>
+          </a:prstGeom>
+          <a:solidFill>
+            <a:schemeClr val="bg1"/>
+          </a:solidFill>
+          <a:ln w="12700" cap="flat" cmpd="sng" algn="ctr">
+            <a:noFill/>
+            <a:prstDash val="solid"/>
+            <a:round/>
+            <a:headEnd type="none" w="med" len="med"/>
+            <a:tailEnd type="none" w="med" len="med"/>
+          </a:ln>
+          <a:effectLst>
+            <a:outerShdw blurRad="63500" sx="102000" sy="102000" algn="ctr" rotWithShape="0">
+              <a:prstClr val="black">
+                <a:alpha val="40000"/>
+              </a:prstClr>
+            </a:outerShdw>
+          </a:effectLst>
+        </p:spPr>
+        <p:txBody>
+          <a:bodyPr vert="horz" wrap="square" lIns="91440" tIns="45720" rIns="91440" bIns="45720" numCol="1" rtlCol="0" anchor="t" anchorCtr="0" compatLnSpc="1">
+            <a:prstTxWarp prst="textNoShape">
+              <a:avLst/>
+            </a:prstTxWarp>
+          </a:bodyPr>
+          <a:lstStyle/>
+          <a:p>
+            <a:pPr marL="0" marR="0" indent="0" algn="l" defTabSz="914400" rtl="0" eaLnBrk="0" fontAlgn="base" latinLnBrk="0" hangingPunct="0">
+              <a:lnSpc>
+                <a:spcPct val="100000"/>
+              </a:lnSpc>
+              <a:spcBef>
+                <a:spcPct val="0"/>
+              </a:spcBef>
+              <a:spcAft>
+                <a:spcPct val="0"/>
+              </a:spcAft>
+              <a:buClrTx/>
+              <a:buSzTx/>
+              <a:buFontTx/>
+              <a:buNone/>
+              <a:tabLst/>
+            </a:pPr>
+            <a:r>
+              <a:rPr kumimoji="0" lang="en-US" sz="1400" b="0" i="0" u="none" strike="noStrike" cap="none" normalizeH="0" baseline="0" dirty="0">
+                <a:ln>
+                  <a:noFill/>
+                </a:ln>
+                <a:solidFill>
+                  <a:schemeClr val="tx1"/>
+                </a:solidFill>
+                <a:effectLst/>
+                <a:latin typeface="LMU CompatilFact" pitchFamily="2" charset="0"/>
+              </a:rPr>
+              <a:t>Motivation</a:t>
+            </a:r>
+          </a:p>
+        </p:txBody>
+      </p:sp>
+      <p:sp>
+        <p:nvSpPr>
+          <p:cNvPr id="5" name="Titre 4">
+            <a:extLst>
+              <a:ext uri="{FF2B5EF4-FFF2-40B4-BE49-F238E27FC236}">
+                <a16:creationId xmlns:a16="http://schemas.microsoft.com/office/drawing/2014/main" id="{1B05E3F6-E972-4F66-BC9C-4479144CE97F}"/>
+              </a:ext>
+            </a:extLst>
+          </p:cNvPr>
+          <p:cNvSpPr>
+            <a:spLocks noGrp="1"/>
+          </p:cNvSpPr>
+          <p:nvPr>
+            <p:ph type="title"/>
+          </p:nvPr>
+        </p:nvSpPr>
+        <p:spPr/>
+        <p:txBody>
+          <a:bodyPr/>
+          <a:lstStyle/>
+          <a:p>
+            <a:r>
+              <a:rPr lang="en-US" dirty="0"/>
+              <a:t>General-purpose computing </a:t>
+            </a:r>
+            <a:br>
+              <a:rPr lang="en-US" dirty="0"/>
+            </a:br>
+            <a:r>
+              <a:rPr lang="en-US" dirty="0"/>
+              <a:t>on GPU (GPGPU)</a:t>
+            </a:r>
+          </a:p>
+        </p:txBody>
+      </p:sp>
+      <p:sp>
+        <p:nvSpPr>
+          <p:cNvPr id="8" name="Textfeld 6">
+            <a:extLst>
+              <a:ext uri="{FF2B5EF4-FFF2-40B4-BE49-F238E27FC236}">
+                <a16:creationId xmlns:a16="http://schemas.microsoft.com/office/drawing/2014/main" id="{588FB6C6-59E4-4887-8F29-F514E894D333}"/>
+              </a:ext>
+            </a:extLst>
+          </p:cNvPr>
+          <p:cNvSpPr txBox="1"/>
+          <p:nvPr/>
+        </p:nvSpPr>
+        <p:spPr>
+          <a:xfrm>
+            <a:off x="143508" y="6331386"/>
+            <a:ext cx="8509520" cy="553998"/>
+          </a:xfrm>
+          <a:prstGeom prst="rect">
+            <a:avLst/>
+          </a:prstGeom>
+          <a:noFill/>
+        </p:spPr>
+        <p:txBody>
+          <a:bodyPr wrap="square" rtlCol="0">
+            <a:spAutoFit/>
+          </a:bodyPr>
+          <a:lstStyle/>
+          <a:p>
+            <a:r>
+              <a:rPr lang="de-DE" sz="1000" dirty="0"/>
+              <a:t> </a:t>
+            </a:r>
+            <a:br>
+              <a:rPr lang="de-DE" sz="1000" dirty="0"/>
+            </a:br>
+            <a:r>
+              <a:rPr lang="de-DE" sz="1000" dirty="0">
+                <a:hlinkClick r:id="rId2"/>
+              </a:rPr>
+              <a:t>https://github.com/mgalloy/cpu-vs-gpu/blob/master/cpu_vs_gpu.pdf</a:t>
+            </a:r>
+            <a:endParaRPr lang="de-DE" sz="1000" dirty="0"/>
+          </a:p>
+          <a:p>
+            <a:r>
+              <a:rPr lang="en-US" sz="1000" dirty="0"/>
+              <a:t>P. Jonathan and T. Josh: A Comparison of Modern GPU and CPU Architectures: And the Common Convergence of Both, 2011</a:t>
+            </a:r>
+            <a:endParaRPr lang="de-DE" sz="1000" dirty="0"/>
+          </a:p>
+        </p:txBody>
+      </p:sp>
+      <p:pic>
+        <p:nvPicPr>
+          <p:cNvPr id="9" name="Picture 2" descr="C:\Users\Dominik\Desktop\Paper_Bilder\img315.jpg">
+            <a:extLst>
+              <a:ext uri="{FF2B5EF4-FFF2-40B4-BE49-F238E27FC236}">
+                <a16:creationId xmlns:a16="http://schemas.microsoft.com/office/drawing/2014/main" id="{4F1ADF43-E18F-43EC-B446-42D54CF16B73}"/>
+              </a:ext>
+            </a:extLst>
+          </p:cNvPr>
+          <p:cNvPicPr>
+            <a:picLocks noChangeAspect="1" noChangeArrowheads="1"/>
+          </p:cNvPicPr>
+          <p:nvPr/>
+        </p:nvPicPr>
+        <p:blipFill>
+          <a:blip r:embed="rId3" cstate="print"/>
+          <a:srcRect/>
+          <a:stretch>
+            <a:fillRect/>
+          </a:stretch>
+        </p:blipFill>
+        <p:spPr bwMode="auto">
+          <a:xfrm>
+            <a:off x="2892342" y="1612068"/>
+            <a:ext cx="3748747" cy="2361869"/>
+          </a:xfrm>
+          <a:prstGeom prst="rect">
+            <a:avLst/>
+          </a:prstGeom>
+          <a:noFill/>
+        </p:spPr>
+      </p:pic>
+      <p:pic>
+        <p:nvPicPr>
+          <p:cNvPr id="10" name="Picture 2" descr="C:\Users\Dominik\Desktop\Paper_Bilder\img311.jpg">
+            <a:extLst>
+              <a:ext uri="{FF2B5EF4-FFF2-40B4-BE49-F238E27FC236}">
+                <a16:creationId xmlns:a16="http://schemas.microsoft.com/office/drawing/2014/main" id="{0E5A8A02-3195-43B5-B45B-E069AEF8479B}"/>
+              </a:ext>
+            </a:extLst>
+          </p:cNvPr>
+          <p:cNvPicPr>
+            <a:picLocks noChangeAspect="1" noChangeArrowheads="1"/>
+          </p:cNvPicPr>
+          <p:nvPr/>
+        </p:nvPicPr>
+        <p:blipFill rotWithShape="1">
+          <a:blip r:embed="rId4" cstate="print"/>
+          <a:srcRect l="32919"/>
+          <a:stretch/>
+        </p:blipFill>
+        <p:spPr bwMode="auto">
+          <a:xfrm>
+            <a:off x="7488324" y="1612067"/>
+            <a:ext cx="1404156" cy="2335141"/>
+          </a:xfrm>
+          <a:prstGeom prst="rect">
+            <a:avLst/>
+          </a:prstGeom>
+          <a:noFill/>
+        </p:spPr>
+      </p:pic>
+      <p:grpSp>
+        <p:nvGrpSpPr>
+          <p:cNvPr id="12" name="Groupe 11">
+            <a:extLst>
+              <a:ext uri="{FF2B5EF4-FFF2-40B4-BE49-F238E27FC236}">
+                <a16:creationId xmlns:a16="http://schemas.microsoft.com/office/drawing/2014/main" id="{55917840-53EE-4B35-9C75-EFC748EE9D1B}"/>
+              </a:ext>
+            </a:extLst>
+          </p:cNvPr>
+          <p:cNvGrpSpPr/>
+          <p:nvPr/>
+        </p:nvGrpSpPr>
+        <p:grpSpPr>
+          <a:xfrm>
+            <a:off x="216424" y="1604665"/>
+            <a:ext cx="2339352" cy="2369273"/>
+            <a:chOff x="2045370" y="1347759"/>
+            <a:chExt cx="2339352" cy="2369273"/>
+          </a:xfrm>
+        </p:grpSpPr>
+        <p:pic>
+          <p:nvPicPr>
+            <p:cNvPr id="7" name="Picture 2">
+              <a:extLst>
+                <a:ext uri="{FF2B5EF4-FFF2-40B4-BE49-F238E27FC236}">
+                  <a16:creationId xmlns:a16="http://schemas.microsoft.com/office/drawing/2014/main" id="{70120F76-797A-452C-BA3D-6C9C418CB607}"/>
+                </a:ext>
+              </a:extLst>
+            </p:cNvPr>
+            <p:cNvPicPr>
+              <a:picLocks noChangeAspect="1" noChangeArrowheads="1"/>
+            </p:cNvPicPr>
+            <p:nvPr/>
+          </p:nvPicPr>
+          <p:blipFill rotWithShape="1">
+            <a:blip r:embed="rId5" cstate="print"/>
+            <a:srcRect l="52549" r="-1" b="5730"/>
+            <a:stretch/>
+          </p:blipFill>
+          <p:spPr bwMode="auto">
+            <a:xfrm>
+              <a:off x="2411760" y="1347759"/>
+              <a:ext cx="1972962" cy="2369273"/>
+            </a:xfrm>
+            <a:prstGeom prst="rect">
+              <a:avLst/>
+            </a:prstGeom>
+            <a:noFill/>
+            <a:ln w="9525">
+              <a:noFill/>
+              <a:miter lim="800000"/>
+              <a:headEnd/>
+              <a:tailEnd/>
+            </a:ln>
+            <a:effectLst/>
+          </p:spPr>
+        </p:pic>
+        <p:pic>
+          <p:nvPicPr>
+            <p:cNvPr id="11" name="Picture 2">
+              <a:extLst>
+                <a:ext uri="{FF2B5EF4-FFF2-40B4-BE49-F238E27FC236}">
+                  <a16:creationId xmlns:a16="http://schemas.microsoft.com/office/drawing/2014/main" id="{EC4BE09F-9A04-4020-900C-4725E08A9095}"/>
+                </a:ext>
+              </a:extLst>
+            </p:cNvPr>
+            <p:cNvPicPr>
+              <a:picLocks noChangeAspect="1" noChangeArrowheads="1"/>
+            </p:cNvPicPr>
+            <p:nvPr/>
+          </p:nvPicPr>
+          <p:blipFill rotWithShape="1">
+            <a:blip r:embed="rId5" cstate="print"/>
+            <a:srcRect r="91188" b="8700"/>
+            <a:stretch/>
+          </p:blipFill>
+          <p:spPr bwMode="auto">
+            <a:xfrm>
+              <a:off x="2045370" y="1347759"/>
+              <a:ext cx="366390" cy="2294627"/>
+            </a:xfrm>
+            <a:prstGeom prst="rect">
+              <a:avLst/>
+            </a:prstGeom>
+            <a:noFill/>
+            <a:ln w="9525">
+              <a:noFill/>
+              <a:miter lim="800000"/>
+              <a:headEnd/>
+              <a:tailEnd/>
+            </a:ln>
+            <a:effectLst/>
+          </p:spPr>
+        </p:pic>
+      </p:grpSp>
+      <p:sp>
+        <p:nvSpPr>
+          <p:cNvPr id="14" name="Flèche : double flèche horizontale 13">
+            <a:extLst>
+              <a:ext uri="{FF2B5EF4-FFF2-40B4-BE49-F238E27FC236}">
+                <a16:creationId xmlns:a16="http://schemas.microsoft.com/office/drawing/2014/main" id="{36A875FF-0966-4CBC-B277-7DA5C31C9D4A}"/>
+              </a:ext>
+            </a:extLst>
+          </p:cNvPr>
+          <p:cNvSpPr/>
+          <p:nvPr/>
+        </p:nvSpPr>
+        <p:spPr bwMode="auto">
+          <a:xfrm>
+            <a:off x="6641089" y="2564905"/>
+            <a:ext cx="775227" cy="504056"/>
+          </a:xfrm>
+          <a:prstGeom prst="leftRightArrow">
+            <a:avLst>
+              <a:gd name="adj1" fmla="val 37343"/>
+              <a:gd name="adj2" fmla="val 39453"/>
+            </a:avLst>
+          </a:prstGeom>
+          <a:solidFill>
+            <a:srgbClr val="FF0000"/>
+          </a:solidFill>
+          <a:ln w="12700" cap="flat" cmpd="sng" algn="ctr">
+            <a:noFill/>
+            <a:prstDash val="solid"/>
+            <a:round/>
+            <a:headEnd type="none" w="med" len="med"/>
+            <a:tailEnd type="none" w="med" len="med"/>
+          </a:ln>
+          <a:effectLst/>
+        </p:spPr>
+        <p:txBody>
+          <a:bodyPr vert="horz" wrap="square" lIns="91440" tIns="45720" rIns="91440" bIns="45720" numCol="1" rtlCol="0" anchor="ctr" anchorCtr="0" compatLnSpc="1">
+            <a:prstTxWarp prst="textNoShape">
+              <a:avLst/>
+            </a:prstTxWarp>
+          </a:bodyPr>
+          <a:lstStyle/>
+          <a:p>
+            <a:pPr marL="0" marR="0" indent="0" algn="l" defTabSz="914400" rtl="0" eaLnBrk="0" fontAlgn="base" latinLnBrk="0" hangingPunct="0">
+              <a:lnSpc>
+                <a:spcPct val="100000"/>
+              </a:lnSpc>
+              <a:spcBef>
+                <a:spcPct val="0"/>
+              </a:spcBef>
+              <a:spcAft>
+                <a:spcPct val="0"/>
+              </a:spcAft>
+              <a:buClrTx/>
+              <a:buSzTx/>
+              <a:buFontTx/>
+              <a:buNone/>
+              <a:tabLst/>
+            </a:pPr>
+            <a:endParaRPr kumimoji="0" lang="en-US" sz="1400" b="0" i="0" u="none" strike="noStrike" cap="none" normalizeH="0" baseline="0">
+              <a:ln>
+                <a:noFill/>
+              </a:ln>
+              <a:solidFill>
+                <a:schemeClr val="tx1"/>
+              </a:solidFill>
+              <a:effectLst/>
+              <a:latin typeface="LMU CompatilFact" pitchFamily="2" charset="0"/>
+            </a:endParaRPr>
+          </a:p>
+        </p:txBody>
+      </p:sp>
+      <p:sp>
+        <p:nvSpPr>
+          <p:cNvPr id="15" name="Éclair 14">
+            <a:extLst>
+              <a:ext uri="{FF2B5EF4-FFF2-40B4-BE49-F238E27FC236}">
+                <a16:creationId xmlns:a16="http://schemas.microsoft.com/office/drawing/2014/main" id="{47C09EAA-4114-4065-9EA4-F3A6D923DF24}"/>
+              </a:ext>
+            </a:extLst>
+          </p:cNvPr>
+          <p:cNvSpPr/>
+          <p:nvPr/>
+        </p:nvSpPr>
+        <p:spPr bwMode="auto">
+          <a:xfrm rot="407489">
+            <a:off x="6724535" y="2276873"/>
+            <a:ext cx="619077" cy="1037333"/>
+          </a:xfrm>
+          <a:prstGeom prst="lightningBolt">
+            <a:avLst/>
+          </a:prstGeom>
+          <a:solidFill>
+            <a:srgbClr val="FFFF00"/>
+          </a:solidFill>
+          <a:ln w="12700" cap="flat" cmpd="sng" algn="ctr">
+            <a:solidFill>
+              <a:schemeClr val="bg1">
+                <a:lumMod val="65000"/>
+              </a:schemeClr>
+            </a:solidFill>
+            <a:prstDash val="solid"/>
+            <a:round/>
+            <a:headEnd type="none" w="med" len="med"/>
+            <a:tailEnd type="none" w="med" len="med"/>
+          </a:ln>
+          <a:effectLst/>
+        </p:spPr>
+        <p:txBody>
+          <a:bodyPr vert="horz" wrap="square" lIns="91440" tIns="45720" rIns="91440" bIns="45720" numCol="1" rtlCol="0" anchor="ctr" anchorCtr="0" compatLnSpc="1">
+            <a:prstTxWarp prst="textNoShape">
+              <a:avLst/>
+            </a:prstTxWarp>
+          </a:bodyPr>
+          <a:lstStyle/>
+          <a:p>
+            <a:pPr marL="0" marR="0" indent="0" algn="l" defTabSz="914400" rtl="0" eaLnBrk="0" fontAlgn="base" latinLnBrk="0" hangingPunct="0">
+              <a:lnSpc>
+                <a:spcPct val="100000"/>
+              </a:lnSpc>
+              <a:spcBef>
+                <a:spcPct val="0"/>
+              </a:spcBef>
+              <a:spcAft>
+                <a:spcPct val="0"/>
+              </a:spcAft>
+              <a:buClrTx/>
+              <a:buSzTx/>
+              <a:buFontTx/>
+              <a:buNone/>
+              <a:tabLst/>
+            </a:pPr>
+            <a:endParaRPr kumimoji="0" lang="en-US" sz="1400" b="0" i="0" u="none" strike="noStrike" cap="none" normalizeH="0" baseline="0">
+              <a:ln>
+                <a:noFill/>
+              </a:ln>
+              <a:solidFill>
+                <a:schemeClr val="tx1"/>
+              </a:solidFill>
+              <a:effectLst/>
+              <a:latin typeface="LMU CompatilFact" pitchFamily="2" charset="0"/>
+            </a:endParaRPr>
+          </a:p>
+        </p:txBody>
+      </p:sp>
+      <p:pic>
+        <p:nvPicPr>
+          <p:cNvPr id="1026" name="Picture 2" descr="Bildergebnis fÃ¼r netflix prize">
+            <a:extLst>
+              <a:ext uri="{FF2B5EF4-FFF2-40B4-BE49-F238E27FC236}">
+                <a16:creationId xmlns:a16="http://schemas.microsoft.com/office/drawing/2014/main" id="{D0924FA4-5165-4FE7-BE9C-AE01D8C125AE}"/>
+              </a:ext>
+            </a:extLst>
+          </p:cNvPr>
+          <p:cNvPicPr>
+            <a:picLocks noChangeAspect="1" noChangeArrowheads="1"/>
+          </p:cNvPicPr>
+          <p:nvPr/>
+        </p:nvPicPr>
+        <p:blipFill rotWithShape="1">
+          <a:blip r:embed="rId6" cstate="print">
+            <a:extLst>
+              <a:ext uri="{28A0092B-C50C-407E-A947-70E740481C1C}">
+                <a14:useLocalDpi xmlns:a14="http://schemas.microsoft.com/office/drawing/2010/main" val="0"/>
+              </a:ext>
+            </a:extLst>
+          </a:blip>
+          <a:srcRect l="21175" r="21175"/>
+          <a:stretch/>
+        </p:blipFill>
+        <p:spPr bwMode="auto">
+          <a:xfrm>
+            <a:off x="1511660" y="4329100"/>
+            <a:ext cx="972108" cy="1124135"/>
+          </a:xfrm>
+          <a:prstGeom prst="rect">
+            <a:avLst/>
+          </a:prstGeom>
+          <a:noFill/>
+          <a:extLst>
+            <a:ext uri="{909E8E84-426E-40DD-AFC4-6F175D3DCCD1}">
+              <a14:hiddenFill xmlns:a14="http://schemas.microsoft.com/office/drawing/2010/main">
+                <a:solidFill>
+                  <a:srgbClr val="FFFFFF"/>
+                </a:solidFill>
+              </a14:hiddenFill>
+            </a:ext>
+          </a:extLst>
+        </p:spPr>
+      </p:pic>
+      <p:pic>
+        <p:nvPicPr>
+          <p:cNvPr id="1028" name="Picture 4" descr="correlation formula">
+            <a:extLst>
+              <a:ext uri="{FF2B5EF4-FFF2-40B4-BE49-F238E27FC236}">
+                <a16:creationId xmlns:a16="http://schemas.microsoft.com/office/drawing/2014/main" id="{CB2EB090-1335-4556-952F-5FEB55829442}"/>
+              </a:ext>
+            </a:extLst>
+          </p:cNvPr>
+          <p:cNvPicPr>
+            <a:picLocks noChangeAspect="1" noChangeArrowheads="1"/>
+          </p:cNvPicPr>
+          <p:nvPr/>
+        </p:nvPicPr>
+        <p:blipFill>
+          <a:blip r:embed="rId7">
+            <a:extLst>
+              <a:ext uri="{28A0092B-C50C-407E-A947-70E740481C1C}">
+                <a14:useLocalDpi xmlns:a14="http://schemas.microsoft.com/office/drawing/2010/main" val="0"/>
+              </a:ext>
+            </a:extLst>
+          </a:blip>
+          <a:srcRect/>
+          <a:stretch>
+            <a:fillRect/>
+          </a:stretch>
+        </p:blipFill>
+        <p:spPr bwMode="auto">
+          <a:xfrm>
+            <a:off x="306748" y="5517232"/>
+            <a:ext cx="2419366" cy="891810"/>
+          </a:xfrm>
+          <a:prstGeom prst="rect">
+            <a:avLst/>
+          </a:prstGeom>
+          <a:noFill/>
+          <a:extLst>
+            <a:ext uri="{909E8E84-426E-40DD-AFC4-6F175D3DCCD1}">
+              <a14:hiddenFill xmlns:a14="http://schemas.microsoft.com/office/drawing/2010/main">
+                <a:solidFill>
+                  <a:srgbClr val="FFFFFF"/>
+                </a:solidFill>
+              </a14:hiddenFill>
+            </a:ext>
+          </a:extLst>
+        </p:spPr>
+      </p:pic>
+      <p:pic>
+        <p:nvPicPr>
+          <p:cNvPr id="17" name="Image 16">
+            <a:extLst>
+              <a:ext uri="{FF2B5EF4-FFF2-40B4-BE49-F238E27FC236}">
+                <a16:creationId xmlns:a16="http://schemas.microsoft.com/office/drawing/2014/main" id="{B947DEC6-25D0-4627-8AF1-32598FA852EA}"/>
+              </a:ext>
+            </a:extLst>
+          </p:cNvPr>
+          <p:cNvPicPr>
+            <a:picLocks noChangeAspect="1"/>
+          </p:cNvPicPr>
+          <p:nvPr/>
+        </p:nvPicPr>
+        <p:blipFill>
+          <a:blip r:embed="rId8"/>
+          <a:stretch>
+            <a:fillRect/>
+          </a:stretch>
+        </p:blipFill>
+        <p:spPr>
+          <a:xfrm>
+            <a:off x="3671900" y="4653136"/>
+            <a:ext cx="4788532" cy="1683748"/>
+          </a:xfrm>
+          <a:prstGeom prst="rect">
+            <a:avLst/>
+          </a:prstGeom>
+        </p:spPr>
+      </p:pic>
+    </p:spTree>
+    <p:extLst>
+      <p:ext uri="{BB962C8B-B14F-4D97-AF65-F5344CB8AC3E}">
+        <p14:creationId xmlns:p14="http://schemas.microsoft.com/office/powerpoint/2010/main" val="608285710"/>
+      </p:ext>
+    </p:extLst>
+  </p:cSld>
+  <p:clrMapOvr>
+    <a:masterClrMapping/>
+  </p:clrMapOvr>
+  <p:transition spd="med"/>
+</p:sld>
+</file>
+
+<file path=ppt/slides/slide2.xml><?xml version="1.0" encoding="utf-8"?>
+<p:sld xmlns:a="http://schemas.openxmlformats.org/drawingml/2006/main" xmlns:r="http://schemas.openxmlformats.org/officeDocument/2006/relationships" xmlns:p="http://schemas.openxmlformats.org/presentationml/2006/main">
+  <p:cSld>
+    <p:spTree>
+      <p:nvGrpSpPr>
+        <p:cNvPr id="1" name=""/>
+        <p:cNvGrpSpPr/>
+        <p:nvPr/>
+      </p:nvGrpSpPr>
+      <p:grpSpPr>
+        <a:xfrm>
+          <a:off x="0" y="0"/>
+          <a:ext cx="0" cy="0"/>
+          <a:chOff x="0" y="0"/>
+          <a:chExt cx="0" cy="0"/>
+        </a:xfrm>
+      </p:grpSpPr>
+      <p:sp>
+        <p:nvSpPr>
           <p:cNvPr id="10" name="Untertitel 9"/>
           <p:cNvSpPr>
             <a:spLocks noGrp="1"/>
@@ -2051,60 +2971,42 @@
           <a:lstStyle/>
           <a:p>
             <a:r>
-              <a:rPr lang="de-DE" dirty="0" smtClean="0"/>
-              <a:t>Blockpraktikum </a:t>
-            </a:r>
-            <a:r>
-              <a:rPr lang="de-DE" dirty="0" smtClean="0"/>
-              <a:t>Modern Computer </a:t>
-            </a:r>
-            <a:r>
-              <a:rPr lang="de-DE" dirty="0" err="1" smtClean="0"/>
+              <a:rPr lang="de-DE" dirty="0"/>
+              <a:t>Blockpraktikum Modern Computer </a:t>
+            </a:r>
+            <a:r>
+              <a:rPr lang="de-DE" dirty="0" err="1"/>
               <a:t>Architecture</a:t>
             </a:r>
-            <a:endParaRPr lang="de-DE" dirty="0" smtClean="0"/>
-          </a:p>
-          <a:p>
-            <a:r>
-              <a:rPr lang="de-DE" dirty="0" smtClean="0"/>
-              <a:t>Aufgabensteller</a:t>
-            </a:r>
-            <a:r>
-              <a:rPr lang="de-DE" dirty="0" smtClean="0"/>
-              <a:t>:</a:t>
-            </a:r>
-            <a:r>
-              <a:rPr lang="de-DE" dirty="0" smtClean="0"/>
+            <a:endParaRPr lang="de-DE" dirty="0"/>
+          </a:p>
+          <a:p>
+            <a:r>
+              <a:rPr lang="de-DE" dirty="0"/>
+              <a:t>Aufgabensteller: Dr. Gordon </a:t>
+            </a:r>
+            <a:r>
+              <a:rPr lang="de-DE" dirty="0" err="1"/>
+              <a:t>Cichon</a:t>
+            </a:r>
+            <a:r>
+              <a:rPr lang="de-DE" dirty="0"/>
               <a:t> </a:t>
             </a:r>
-            <a:r>
-              <a:rPr lang="de-DE" dirty="0" smtClean="0"/>
-              <a:t>Dr. Gordon </a:t>
-            </a:r>
-            <a:r>
-              <a:rPr lang="de-DE" dirty="0" err="1" smtClean="0"/>
-              <a:t>Cichon</a:t>
-            </a:r>
-            <a:r>
-              <a:rPr lang="de-DE" dirty="0" smtClean="0"/>
-              <a:t> </a:t>
-            </a:r>
-            <a:endParaRPr lang="de-DE" dirty="0"/>
-          </a:p>
-          <a:p>
-            <a:r>
-              <a:rPr lang="de-DE" dirty="0" smtClean="0"/>
+          </a:p>
+          <a:p>
+            <a:r>
+              <a:rPr lang="de-DE" dirty="0"/>
               <a:t>Datum: </a:t>
             </a:r>
             <a:r>
-              <a:rPr lang="de-DE" dirty="0" err="1" smtClean="0"/>
+              <a:rPr lang="de-DE" dirty="0" err="1"/>
               <a:t>xx</a:t>
             </a:r>
             <a:r>
-              <a:rPr lang="de-DE" dirty="0" smtClean="0"/>
+              <a:rPr lang="de-DE" dirty="0"/>
               <a:t>. Juli 2018 </a:t>
             </a:r>
-            <a:endParaRPr lang="de-DE" dirty="0"/>
           </a:p>
         </p:txBody>
       </p:sp>
@@ -2124,18 +3026,14 @@
           <a:lstStyle/>
           <a:p>
             <a:r>
-              <a:rPr lang="en-US" dirty="0" smtClean="0"/>
+              <a:rPr lang="en-US" dirty="0"/>
               <a:t>General-purpose computing </a:t>
             </a:r>
-            <a:r>
-              <a:rPr lang="en-US" dirty="0" smtClean="0"/>
-              <a:t/>
-            </a:r>
             <a:br>
-              <a:rPr lang="en-US" dirty="0" smtClean="0"/>
+              <a:rPr lang="en-US" dirty="0"/>
             </a:br>
             <a:r>
-              <a:rPr lang="en-US" dirty="0" smtClean="0"/>
+              <a:rPr lang="en-US" dirty="0"/>
               <a:t>on GPU (GPGPU)</a:t>
             </a:r>
             <a:endParaRPr lang="de-DE" dirty="0"/>
@@ -2158,11 +3056,11 @@
           <a:lstStyle/>
           <a:p>
             <a:r>
-              <a:rPr lang="de-DE" dirty="0" smtClean="0"/>
+              <a:rPr lang="de-DE" dirty="0"/>
               <a:t>Dominik </a:t>
             </a:r>
             <a:r>
-              <a:rPr lang="de-DE" dirty="0" err="1" smtClean="0"/>
+              <a:rPr lang="de-DE" dirty="0" err="1"/>
               <a:t>Bitzer</a:t>
             </a:r>
             <a:endParaRPr lang="de-DE" dirty="0"/>
@@ -2172,7 +3070,7 @@
     </p:spTree>
     <p:extLst>
       <p:ext uri="{BB962C8B-B14F-4D97-AF65-F5344CB8AC3E}">
-        <p14:creationId xmlns:p14="http://schemas.microsoft.com/office/powerpoint/2010/main" xmlns="" val="2931754677"/>
+        <p14:creationId xmlns:p14="http://schemas.microsoft.com/office/powerpoint/2010/main" val="2931754677"/>
       </p:ext>
     </p:extLst>
   </p:cSld>
@@ -2183,7 +3081,7 @@
 </p:sld>
 </file>
 
-<file path=ppt/slides/slide2.xml><?xml version="1.0" encoding="utf-8"?>
+<file path=ppt/slides/slide3.xml><?xml version="1.0" encoding="utf-8"?>
 <p:sld xmlns:a="http://schemas.openxmlformats.org/drawingml/2006/main" xmlns:r="http://schemas.openxmlformats.org/officeDocument/2006/relationships" xmlns:p="http://schemas.openxmlformats.org/presentationml/2006/main">
   <p:cSld>
     <p:spTree>
@@ -2216,10 +3114,9 @@
           <a:lstStyle/>
           <a:p>
             <a:r>
-              <a:rPr lang="de-DE" dirty="0" smtClean="0"/>
+              <a:rPr lang="de-DE" dirty="0"/>
               <a:t>Motivation und Hintergrund</a:t>
             </a:r>
-            <a:endParaRPr lang="de-DE" dirty="0"/>
           </a:p>
         </p:txBody>
       </p:sp>
@@ -2239,42 +3136,44 @@
           <a:lstStyle/>
           <a:p>
             <a:r>
-              <a:rPr lang="de-DE" dirty="0" smtClean="0"/>
+              <a:rPr lang="de-DE" dirty="0"/>
               <a:t>GPU vs. CPU: </a:t>
             </a:r>
           </a:p>
           <a:p>
             <a:pPr lvl="1"/>
             <a:r>
-              <a:rPr lang="de-DE" dirty="0" smtClean="0"/>
+              <a:rPr lang="de-DE" dirty="0"/>
               <a:t>GLOPs: ca. 6,5x</a:t>
             </a:r>
           </a:p>
           <a:p>
             <a:pPr lvl="1"/>
             <a:r>
-              <a:rPr lang="de-DE" dirty="0" smtClean="0"/>
+              <a:rPr lang="de-DE" dirty="0"/>
+              <a:t>Bandbreite: ca. 4,3x</a:t>
+            </a:r>
+          </a:p>
+          <a:p>
+            <a:pPr lvl="1"/>
+            <a:r>
+              <a:rPr lang="de-DE" dirty="0"/>
               <a:t>Leistungsaufnahme: ca. 1,7x</a:t>
             </a:r>
           </a:p>
           <a:p>
             <a:pPr lvl="1"/>
             <a:r>
-              <a:rPr lang="de-DE" dirty="0" smtClean="0"/>
+              <a:rPr lang="de-DE" dirty="0"/>
               <a:t>Effizienz: ca. 3,8x</a:t>
             </a:r>
-          </a:p>
-          <a:p>
-            <a:pPr lvl="1"/>
-            <a:r>
-              <a:rPr lang="de-DE" dirty="0" smtClean="0"/>
-              <a:t>B</a:t>
-            </a:r>
-            <a:r>
-              <a:rPr lang="de-DE" dirty="0" smtClean="0"/>
-              <a:t>andbreite: ca. 4,3x</a:t>
-            </a:r>
-            <a:endParaRPr lang="de-DE" dirty="0"/>
+            <a:br>
+              <a:rPr lang="de-DE" dirty="0"/>
+            </a:br>
+            <a:r>
+              <a:rPr lang="de-DE" dirty="0"/>
+              <a:t>(GFLOP / Watt)</a:t>
+            </a:r>
           </a:p>
         </p:txBody>
       </p:sp>
@@ -2301,7 +3200,7 @@
               <a:pPr>
                 <a:defRPr/>
               </a:pPr>
-              <a:t>2</a:t>
+              <a:t>3</a:t>
             </a:fld>
             <a:endParaRPr lang="de-DE" dirty="0"/>
           </a:p>
@@ -2323,7 +3222,7 @@
           <a:lstStyle/>
           <a:p>
             <a:r>
-              <a:rPr lang="de-DE" smtClean="0"/>
+              <a:rPr lang="de-DE"/>
               <a:t>Vortrags-Kurztitel (Für alle Folien setzen: Klick auf "Einfügen" - "Kopf- und Fußzeile")</a:t>
             </a:r>
             <a:endParaRPr lang="de-DE" dirty="0"/>
@@ -2347,7 +3246,7 @@
         </p:blipFill>
         <p:spPr bwMode="auto">
           <a:xfrm>
-            <a:off x="3121236" y="2642719"/>
+            <a:off x="3121236" y="2726638"/>
             <a:ext cx="5688632" cy="3438666"/>
           </a:xfrm>
           <a:prstGeom prst="rect">
@@ -2386,59 +3285,35 @@
           <a:lstStyle/>
           <a:p>
             <a:r>
-              <a:rPr lang="de-DE" sz="1000" dirty="0" smtClean="0"/>
+              <a:rPr lang="de-DE" sz="1000" dirty="0"/>
               <a:t>Quellen: </a:t>
             </a:r>
             <a:br>
-              <a:rPr lang="de-DE" sz="1000" dirty="0" smtClean="0"/>
+              <a:rPr lang="de-DE" sz="1000" dirty="0"/>
             </a:br>
             <a:r>
-              <a:rPr lang="de-DE" sz="1000" dirty="0" smtClean="0">
+              <a:rPr lang="de-DE" sz="1000" dirty="0">
                 <a:hlinkClick r:id="rId3"/>
               </a:rPr>
-              <a:t>https</a:t>
-            </a:r>
-            <a:r>
-              <a:rPr lang="de-DE" sz="1000" dirty="0" smtClean="0">
-                <a:hlinkClick r:id="rId3"/>
-              </a:rPr>
-              <a:t>://</a:t>
-            </a:r>
-            <a:r>
-              <a:rPr lang="de-DE" sz="1000" dirty="0" smtClean="0">
-                <a:hlinkClick r:id="rId3"/>
-              </a:rPr>
-              <a:t>github.com/mgalloy/cpu-vs-gpu/blob/master/cpu_vs_gpu.pdf</a:t>
-            </a:r>
-            <a:endParaRPr lang="de-DE" sz="1000" dirty="0" smtClean="0"/>
-          </a:p>
-          <a:p>
-            <a:r>
-              <a:rPr lang="de-DE" sz="1000" dirty="0" smtClean="0">
+              <a:t>https://github.com/mgalloy/cpu-vs-gpu/blob/master/cpu_vs_gpu.pdf</a:t>
+            </a:r>
+            <a:endParaRPr lang="de-DE" sz="1000" dirty="0"/>
+          </a:p>
+          <a:p>
+            <a:r>
+              <a:rPr lang="de-DE" sz="1000" dirty="0">
                 <a:hlinkClick r:id="rId4"/>
               </a:rPr>
-              <a:t>https://</a:t>
-            </a:r>
-            <a:r>
-              <a:rPr lang="de-DE" sz="1000" dirty="0" smtClean="0">
-                <a:hlinkClick r:id="rId4"/>
-              </a:rPr>
-              <a:t>ark.intel.com/products/91317/Intel-Xeon-Processor-E5-2699-v4-55M-Cache-2_20-GHz</a:t>
-            </a:r>
-            <a:endParaRPr lang="de-DE" sz="1000" dirty="0" smtClean="0"/>
-          </a:p>
-          <a:p>
-            <a:r>
-              <a:rPr lang="de-DE" sz="1000" dirty="0" smtClean="0">
+              <a:t>https://ark.intel.com/products/91317/Intel-Xeon-Processor-E5-2699-v4-55M-Cache-2_20-GHz</a:t>
+            </a:r>
+            <a:endParaRPr lang="de-DE" sz="1000" dirty="0"/>
+          </a:p>
+          <a:p>
+            <a:r>
+              <a:rPr lang="de-DE" sz="1000" dirty="0">
                 <a:hlinkClick r:id="rId5"/>
               </a:rPr>
-              <a:t>https://</a:t>
-            </a:r>
-            <a:r>
-              <a:rPr lang="de-DE" sz="1000" dirty="0" smtClean="0">
-                <a:hlinkClick r:id="rId5"/>
-              </a:rPr>
-              <a:t>www.geforce.com/hardware/desktop-gpus/geforce-gtx-titan-x/specifications</a:t>
+              <a:t>https://www.geforce.com/hardware/desktop-gpus/geforce-gtx-titan-x/specifications</a:t>
             </a:r>
             <a:endParaRPr lang="de-DE" sz="1000" dirty="0"/>
           </a:p>
@@ -2468,10 +3343,9 @@
           <a:p>
             <a:pPr algn="ctr"/>
             <a:r>
-              <a:rPr lang="de-DE" sz="1000" dirty="0" smtClean="0"/>
+              <a:rPr lang="de-DE" sz="1000" dirty="0"/>
               <a:t>Max. 145 Watt</a:t>
             </a:r>
-            <a:endParaRPr lang="de-DE" sz="1000" dirty="0"/>
           </a:p>
         </p:txBody>
       </p:sp>
@@ -2499,17 +3373,16 @@
           <a:p>
             <a:pPr algn="ctr"/>
             <a:r>
-              <a:rPr lang="de-DE" sz="1000" dirty="0" smtClean="0"/>
+              <a:rPr lang="de-DE" sz="1000" dirty="0"/>
               <a:t>Max. 250 Watt</a:t>
             </a:r>
-            <a:endParaRPr lang="de-DE" sz="1000" dirty="0"/>
           </a:p>
         </p:txBody>
       </p:sp>
     </p:spTree>
     <p:extLst>
       <p:ext uri="{BB962C8B-B14F-4D97-AF65-F5344CB8AC3E}">
-        <p14:creationId xmlns:p14="http://schemas.microsoft.com/office/powerpoint/2010/main" xmlns="" val="3273344848"/>
+        <p14:creationId xmlns:p14="http://schemas.microsoft.com/office/powerpoint/2010/main" val="3273344848"/>
       </p:ext>
     </p:extLst>
   </p:cSld>
@@ -2517,17 +3390,10 @@
     <a:masterClrMapping/>
   </p:clrMapOvr>
   <p:transition spd="med"/>
-  <p:timing>
-    <p:tnLst>
-      <p:par>
-        <p:cTn id="1" dur="indefinite" restart="never" nodeType="tmRoot"/>
-      </p:par>
-    </p:tnLst>
-  </p:timing>
 </p:sld>
 </file>
 
-<file path=ppt/slides/slide3.xml><?xml version="1.0" encoding="utf-8"?>
+<file path=ppt/slides/slide4.xml><?xml version="1.0" encoding="utf-8"?>
 <p:sld xmlns:a="http://schemas.openxmlformats.org/drawingml/2006/main" xmlns:r="http://schemas.openxmlformats.org/officeDocument/2006/relationships" xmlns:p="http://schemas.openxmlformats.org/presentationml/2006/main">
   <p:cSld>
     <p:spTree>
@@ -2560,10 +3426,9 @@
           <a:lstStyle/>
           <a:p>
             <a:r>
-              <a:rPr lang="de-DE" dirty="0" smtClean="0"/>
+              <a:rPr lang="de-DE" dirty="0"/>
               <a:t>Motivation und Hintergrund</a:t>
             </a:r>
-            <a:endParaRPr lang="de-DE" dirty="0"/>
           </a:p>
         </p:txBody>
       </p:sp>
@@ -2590,7 +3455,7 @@
               <a:pPr>
                 <a:defRPr/>
               </a:pPr>
-              <a:t>3</a:t>
+              <a:t>4</a:t>
             </a:fld>
             <a:endParaRPr lang="de-DE" dirty="0"/>
           </a:p>
@@ -2612,7 +3477,7 @@
           <a:lstStyle/>
           <a:p>
             <a:r>
-              <a:rPr lang="de-DE" smtClean="0"/>
+              <a:rPr lang="de-DE"/>
               <a:t>Vortrags-Kurztitel (Für alle Folien setzen: Klick auf "Einfügen" - "Kopf- und Fußzeile")</a:t>
             </a:r>
             <a:endParaRPr lang="de-DE" dirty="0"/>
@@ -2642,14 +3507,14 @@
           <a:lstStyle/>
           <a:p>
             <a:r>
-              <a:rPr lang="de-DE" sz="1000" dirty="0" smtClean="0"/>
+              <a:rPr lang="de-DE" sz="1000" dirty="0"/>
               <a:t>Quellen: </a:t>
             </a:r>
             <a:br>
-              <a:rPr lang="de-DE" sz="1000" dirty="0" smtClean="0"/>
+              <a:rPr lang="de-DE" sz="1000" dirty="0"/>
             </a:br>
             <a:r>
-              <a:rPr lang="en-US" sz="1000" dirty="0" smtClean="0"/>
+              <a:rPr lang="en-US" sz="1000" dirty="0"/>
               <a:t> P. Jonathan and T. Josh: A Comparison of Modern GPU and CPU Architectures: And the Common Convergence of Both, 2011</a:t>
             </a:r>
             <a:endParaRPr lang="de-DE" sz="1000" dirty="0"/>
@@ -2672,44 +3537,36 @@
           <a:lstStyle/>
           <a:p>
             <a:r>
-              <a:rPr lang="de-DE" dirty="0" smtClean="0"/>
+              <a:rPr lang="de-DE" dirty="0"/>
               <a:t>CPU Architektur:</a:t>
             </a:r>
           </a:p>
           <a:p>
             <a:pPr lvl="1"/>
             <a:r>
-              <a:rPr lang="de-DE" dirty="0" smtClean="0"/>
+              <a:rPr lang="de-DE" dirty="0"/>
               <a:t>Wenige Kerne mit hoher </a:t>
             </a:r>
             <a:r>
-              <a:rPr lang="de-DE" dirty="0" err="1" smtClean="0"/>
+              <a:rPr lang="de-DE" dirty="0" err="1"/>
               <a:t>single-thread</a:t>
             </a:r>
             <a:r>
-              <a:rPr lang="de-DE" dirty="0" smtClean="0"/>
+              <a:rPr lang="de-DE" dirty="0"/>
               <a:t> Leistung</a:t>
             </a:r>
           </a:p>
           <a:p>
             <a:pPr lvl="1"/>
             <a:r>
-              <a:rPr lang="de-DE" dirty="0" smtClean="0"/>
-              <a:t>Wenige Register, aber große, </a:t>
-            </a:r>
-            <a:r>
-              <a:rPr lang="de-DE" dirty="0" smtClean="0"/>
-              <a:t>hierarchisch organisierte</a:t>
-            </a:r>
-            <a:r>
-              <a:rPr lang="de-DE" dirty="0" smtClean="0"/>
-              <a:t> Caches</a:t>
+              <a:rPr lang="de-DE" dirty="0"/>
+              <a:t>Wenige Register, aber große, hierarchisch organisierte Caches</a:t>
             </a:r>
           </a:p>
           <a:p>
             <a:pPr lvl="1"/>
             <a:r>
-              <a:rPr lang="de-DE" dirty="0" smtClean="0"/>
+              <a:rPr lang="de-DE" dirty="0"/>
               <a:t>Ziel: geringe Latenz, schnelle Abarbeitung serieller Tasks</a:t>
             </a:r>
           </a:p>
@@ -2748,7 +3605,7 @@
     </p:spTree>
     <p:extLst>
       <p:ext uri="{BB962C8B-B14F-4D97-AF65-F5344CB8AC3E}">
-        <p14:creationId xmlns:p14="http://schemas.microsoft.com/office/powerpoint/2010/main" xmlns="" val="3273344848"/>
+        <p14:creationId xmlns:p14="http://schemas.microsoft.com/office/powerpoint/2010/main" val="3273344848"/>
       </p:ext>
     </p:extLst>
   </p:cSld>
@@ -2756,17 +3613,10 @@
     <a:masterClrMapping/>
   </p:clrMapOvr>
   <p:transition spd="med"/>
-  <p:timing>
-    <p:tnLst>
-      <p:par>
-        <p:cTn id="1" dur="indefinite" restart="never" nodeType="tmRoot"/>
-      </p:par>
-    </p:tnLst>
-  </p:timing>
 </p:sld>
 </file>
 
-<file path=ppt/slides/slide4.xml><?xml version="1.0" encoding="utf-8"?>
+<file path=ppt/slides/slide5.xml><?xml version="1.0" encoding="utf-8"?>
 <p:sld xmlns:a="http://schemas.openxmlformats.org/drawingml/2006/main" xmlns:r="http://schemas.openxmlformats.org/officeDocument/2006/relationships" xmlns:p="http://schemas.openxmlformats.org/presentationml/2006/main">
   <p:cSld>
     <p:spTree>
@@ -2825,10 +3675,9 @@
           <a:lstStyle/>
           <a:p>
             <a:r>
-              <a:rPr lang="de-DE" dirty="0" smtClean="0"/>
+              <a:rPr lang="de-DE" dirty="0"/>
               <a:t>Motivation und Hintergrund</a:t>
             </a:r>
-            <a:endParaRPr lang="de-DE" dirty="0"/>
           </a:p>
         </p:txBody>
       </p:sp>
@@ -2855,7 +3704,7 @@
               <a:pPr>
                 <a:defRPr/>
               </a:pPr>
-              <a:t>4</a:t>
+              <a:t>5</a:t>
             </a:fld>
             <a:endParaRPr lang="de-DE" dirty="0"/>
           </a:p>
@@ -2877,7 +3726,7 @@
           <a:lstStyle/>
           <a:p>
             <a:r>
-              <a:rPr lang="de-DE" smtClean="0"/>
+              <a:rPr lang="de-DE"/>
               <a:t>Vortrags-Kurztitel (Für alle Folien setzen: Klick auf "Einfügen" - "Kopf- und Fußzeile")</a:t>
             </a:r>
             <a:endParaRPr lang="de-DE" dirty="0"/>
@@ -2907,14 +3756,14 @@
           <a:lstStyle/>
           <a:p>
             <a:r>
-              <a:rPr lang="de-DE" sz="1000" dirty="0" smtClean="0"/>
+              <a:rPr lang="de-DE" sz="1000" dirty="0"/>
               <a:t>Quellen: </a:t>
             </a:r>
             <a:br>
-              <a:rPr lang="de-DE" sz="1000" dirty="0" smtClean="0"/>
+              <a:rPr lang="de-DE" sz="1000" dirty="0"/>
             </a:br>
             <a:r>
-              <a:rPr lang="en-US" sz="1000" dirty="0" smtClean="0"/>
+              <a:rPr lang="en-US" sz="1000" dirty="0"/>
               <a:t> P. Jonathan and T. Josh: A Comparison of Modern GPU and CPU Architectures: And the Common Convergence of Both, 2011</a:t>
             </a:r>
             <a:endParaRPr lang="de-DE" sz="1000" dirty="0"/>
@@ -2942,66 +3791,37 @@
           <a:lstStyle/>
           <a:p>
             <a:r>
-              <a:rPr lang="de-DE" dirty="0" smtClean="0"/>
-              <a:t>G</a:t>
-            </a:r>
-            <a:r>
-              <a:rPr lang="de-DE" dirty="0" smtClean="0"/>
-              <a:t>PU Architektur:</a:t>
+              <a:rPr lang="de-DE" dirty="0"/>
+              <a:t>GPU Architektur:</a:t>
             </a:r>
           </a:p>
           <a:p>
             <a:pPr lvl="1"/>
             <a:r>
-              <a:rPr lang="de-DE" dirty="0" smtClean="0"/>
-              <a:t>Viele Kerne </a:t>
-            </a:r>
-            <a:r>
-              <a:rPr lang="de-DE" dirty="0" smtClean="0"/>
-              <a:t>mit </a:t>
-            </a:r>
-            <a:r>
-              <a:rPr lang="de-DE" dirty="0" smtClean="0"/>
-              <a:t>geringer </a:t>
-            </a:r>
-            <a:r>
-              <a:rPr lang="de-DE" dirty="0" err="1" smtClean="0"/>
+              <a:rPr lang="de-DE" dirty="0"/>
+              <a:t>Viele Kerne mit geringer </a:t>
+            </a:r>
+            <a:r>
+              <a:rPr lang="de-DE" dirty="0" err="1"/>
               <a:t>single-thread</a:t>
             </a:r>
             <a:r>
-              <a:rPr lang="de-DE" dirty="0" smtClean="0"/>
-              <a:t> </a:t>
-            </a:r>
-            <a:r>
-              <a:rPr lang="de-DE" dirty="0" smtClean="0"/>
-              <a:t>Leistung</a:t>
+              <a:rPr lang="de-DE" dirty="0"/>
+              <a:t> Leistung</a:t>
             </a:r>
           </a:p>
           <a:p>
             <a:pPr lvl="1"/>
             <a:r>
-              <a:rPr lang="de-DE" dirty="0" smtClean="0"/>
-              <a:t>Viele </a:t>
-            </a:r>
-            <a:r>
-              <a:rPr lang="de-DE" dirty="0" smtClean="0"/>
-              <a:t>Register, </a:t>
-            </a:r>
-            <a:r>
-              <a:rPr lang="de-DE" dirty="0" smtClean="0"/>
-              <a:t>kleinere Caches</a:t>
-            </a:r>
-            <a:endParaRPr lang="de-DE" dirty="0" smtClean="0"/>
+              <a:rPr lang="de-DE" dirty="0"/>
+              <a:t>Viele Register, kleinere Caches</a:t>
+            </a:r>
           </a:p>
           <a:p>
             <a:pPr lvl="1"/>
             <a:r>
-              <a:rPr lang="de-DE" dirty="0" smtClean="0"/>
-              <a:t>Ziel: </a:t>
-            </a:r>
-            <a:r>
-              <a:rPr lang="de-DE" dirty="0" smtClean="0"/>
-              <a:t>hoher Durchsatz ähnlicher Berechnungen</a:t>
+              <a:rPr lang="de-DE" dirty="0"/>
+              <a:t>Ziel: hoher Durchsatz ähnlicher Berechnungen</a:t>
             </a:r>
           </a:p>
           <a:p>
@@ -3086,7 +3906,7 @@
               <a:buNone/>
               <a:tabLst/>
             </a:pPr>
-            <a:endParaRPr kumimoji="0" lang="de-DE" sz="1400" b="0" i="0" u="none" strike="noStrike" cap="none" normalizeH="0" baseline="0" smtClean="0">
+            <a:endParaRPr kumimoji="0" lang="de-DE" sz="1400" b="0" i="0" u="none" strike="noStrike" cap="none" normalizeH="0" baseline="0">
               <a:ln>
                 <a:noFill/>
               </a:ln>
@@ -3149,7 +3969,7 @@
               <a:buNone/>
               <a:tabLst/>
             </a:pPr>
-            <a:endParaRPr kumimoji="0" lang="de-DE" sz="1400" b="0" i="0" u="none" strike="noStrike" cap="none" normalizeH="0" baseline="0" smtClean="0">
+            <a:endParaRPr kumimoji="0" lang="de-DE" sz="1400" b="0" i="0" u="none" strike="noStrike" cap="none" normalizeH="0" baseline="0">
               <a:ln>
                 <a:noFill/>
               </a:ln>
@@ -3191,7 +4011,7 @@
     </p:spTree>
     <p:extLst>
       <p:ext uri="{BB962C8B-B14F-4D97-AF65-F5344CB8AC3E}">
-        <p14:creationId xmlns:p14="http://schemas.microsoft.com/office/powerpoint/2010/main" xmlns="" val="3273344848"/>
+        <p14:creationId xmlns:p14="http://schemas.microsoft.com/office/powerpoint/2010/main" val="3273344848"/>
       </p:ext>
     </p:extLst>
   </p:cSld>
@@ -3199,13 +4019,6 @@
     <a:masterClrMapping/>
   </p:clrMapOvr>
   <p:transition spd="med"/>
-  <p:timing>
-    <p:tnLst>
-      <p:par>
-        <p:cTn id="1" dur="indefinite" restart="never" nodeType="tmRoot"/>
-      </p:par>
-    </p:tnLst>
-  </p:timing>
 </p:sld>
 </file>
 

</xml_diff>